<commit_message>
Se hicieron cambios en la presentación del proyecto
</commit_message>
<xml_diff>
--- a/proy_formativo/documentacion/1er_Trim/1 - Plantilla de Presentación de la Sustentacion.pptx
+++ b/proy_formativo/documentacion/1er_Trim/1 - Plantilla de Presentación de la Sustentacion.pptx
@@ -271,7 +271,7 @@
       </p15:sldGuideLst>
     </p:ext>
     <p:ext uri="http://customooxmlschemas.google.com/">
-      <go:slidesCustomData xmlns:go="http://customooxmlschemas.google.com/" xmlns:ahyp="http://schemas.microsoft.com/office/drawing/2018/hyperlinkcolor" xmlns:p15="http://schemas.microsoft.com/office/powerpoint/2012/main" xmlns:p14="http://schemas.microsoft.com/office/powerpoint/2010/main" xmlns:com="http://schemas.openxmlformats.org/drawingml/2006/compatibility" xmlns:pvml="urn:schemas-microsoft-com:office:powerpoint" xmlns:v="urn:schemas-microsoft-com:vml" xmlns:o="urn:schemas-microsoft-com:office:office" xmlns:dgm="http://schemas.openxmlformats.org/drawingml/2006/diagram" xmlns:c="http://schemas.openxmlformats.org/drawingml/2006/chart" xmlns:mv="urn:schemas-microsoft-com:mac:vml" xmlns:mc="http://schemas.openxmlformats.org/markup-compatibility/2006" xmlns="" r:id="rId20" roundtripDataSignature="AMtx7miIMXweoysT6FAjl+4ZcD50YC5qJA=="/>
+      <go:slidesCustomData xmlns="" xmlns:mc="http://schemas.openxmlformats.org/markup-compatibility/2006" xmlns:mv="urn:schemas-microsoft-com:mac:vml" xmlns:c="http://schemas.openxmlformats.org/drawingml/2006/chart" xmlns:dgm="http://schemas.openxmlformats.org/drawingml/2006/diagram" xmlns:o="urn:schemas-microsoft-com:office:office" xmlns:v="urn:schemas-microsoft-com:vml" xmlns:pvml="urn:schemas-microsoft-com:office:powerpoint" xmlns:com="http://schemas.openxmlformats.org/drawingml/2006/compatibility" xmlns:p14="http://schemas.microsoft.com/office/powerpoint/2010/main" xmlns:p15="http://schemas.microsoft.com/office/powerpoint/2012/main" xmlns:ahyp="http://schemas.microsoft.com/office/drawing/2018/hyperlinkcolor" xmlns:go="http://customooxmlschemas.google.com/" r:id="rId20" roundtripDataSignature="AMtx7miIMXweoysT6FAjl+4ZcD50YC5qJA=="/>
     </p:ext>
   </p:extLst>
 </p:presentation>
@@ -889,8 +889,8 @@
         </p:nvSpPr>
         <p:spPr>
           <a:xfrm>
-            <a:off x="1143225" y="685800"/>
-            <a:ext cx="4572225" cy="3429000"/>
+            <a:off x="381000" y="685800"/>
+            <a:ext cx="6096000" cy="3429000"/>
           </a:xfrm>
           <a:custGeom>
             <a:avLst/>
@@ -1830,8 +1830,8 @@
         </p:nvSpPr>
         <p:spPr>
           <a:xfrm>
-            <a:off x="1143225" y="685800"/>
-            <a:ext cx="4572225" cy="3429000"/>
+            <a:off x="381000" y="685800"/>
+            <a:ext cx="6096000" cy="3429000"/>
           </a:xfrm>
           <a:custGeom>
             <a:avLst/>
@@ -2038,8 +2038,8 @@
         </p:nvSpPr>
         <p:spPr>
           <a:xfrm>
-            <a:off x="1143225" y="685800"/>
-            <a:ext cx="4572225" cy="3429000"/>
+            <a:off x="381000" y="685800"/>
+            <a:ext cx="6096000" cy="3429000"/>
           </a:xfrm>
           <a:custGeom>
             <a:avLst/>
@@ -2246,8 +2246,8 @@
         </p:nvSpPr>
         <p:spPr>
           <a:xfrm>
-            <a:off x="1143225" y="685800"/>
-            <a:ext cx="4572225" cy="3429000"/>
+            <a:off x="381000" y="685800"/>
+            <a:ext cx="6096000" cy="3429000"/>
           </a:xfrm>
           <a:custGeom>
             <a:avLst/>
@@ -8086,7 +8086,7 @@
               <a:buNone/>
             </a:pPr>
             <a:r>
-              <a:rPr lang="es-ES" sz="1800">
+              <a:rPr lang="es-ES" sz="1800" dirty="0">
                 <a:solidFill>
                   <a:srgbClr val="3F3F3F"/>
                 </a:solidFill>
@@ -8095,9 +8095,9 @@
                 <a:cs typeface="Calibri"/>
                 <a:sym typeface="Calibri"/>
               </a:rPr>
-              <a:t>En este apartado se muestra lo que va a hacer el sistema y el tiempo que va a tomar para realizar e implementar.</a:t>
+              <a:t>En este apartado se muestra lo que va a hacer el sistema y el tiempo que va a tomar para realizarse e implementarse.</a:t>
             </a:r>
-            <a:endParaRPr/>
+            <a:endParaRPr dirty="0"/>
           </a:p>
         </p:txBody>
       </p:sp>
@@ -8170,8 +8170,8 @@
         </p:blipFill>
         <p:spPr>
           <a:xfrm>
-            <a:off x="7985760" y="4413504"/>
-            <a:ext cx="1158240" cy="729996"/>
+            <a:off x="7826188" y="4639234"/>
+            <a:ext cx="1317812" cy="504265"/>
           </a:xfrm>
           <a:prstGeom prst="rect">
             <a:avLst/>
@@ -8328,7 +8328,7 @@
                 <a:cs typeface="Calibri"/>
                 <a:sym typeface="Calibri"/>
               </a:rPr>
-              <a:t>El sistema únicamente se va a enfocar en dar solución a la gestión de inventarios, gestión de usuarios y gestión de proveedores, cada uno de estos con la opción para crear, actualizar y eliminar; también se podrá generar un reporte gráfico el cual permitirá ver la información por cada uno de los módulos.</a:t>
+              <a:t>El sistema únicamente se va a enfocar en dar solución a la gestión de inventarios, usuarios y proveedores, cada uno de estos con la opción para crear, actualizar, consultar y eliminar; también se podrá generar un reporte gráfico el cual permitirá ver la información por cada uno de los módulos.</a:t>
             </a:r>
           </a:p>
           <a:p>
@@ -11738,7 +11738,7 @@
         <p:spPr>
           <a:xfrm>
             <a:off x="417925" y="1517000"/>
-            <a:ext cx="8308200" cy="2331900"/>
+            <a:ext cx="8308200" cy="2308284"/>
           </a:xfrm>
           <a:prstGeom prst="rect">
             <a:avLst/>
@@ -11764,7 +11764,7 @@
               <a:buNone/>
             </a:pPr>
             <a:r>
-              <a:rPr lang="es-ES" sz="1600">
+              <a:rPr lang="es-ES" sz="1600" dirty="0">
                 <a:solidFill>
                   <a:srgbClr val="3F3F3F"/>
                 </a:solidFill>
@@ -11773,9 +11773,9 @@
                 <a:cs typeface="Calibri"/>
                 <a:sym typeface="Calibri"/>
               </a:rPr>
-              <a:t>La microempresa Vigutoz se dedica a la fabricación de diferentes tipos de prendas para niños. Los procesos clave que más relevancia tienen dentro de la microempresa son: la fabricación de las prendas, la gestión de inventarios y el proceso de logística. Los métodos de análisis de información implementados fueron: entrevistas y la observación directa, esto para visualizar cómo se ejecutaban cada uno los procesos. Se realizó con ayuda de la propietaria de la microempresa.</a:t>
+              <a:t>La microempresa Vigutoz se dedica a la fabricación de diferentes tipos de prendas para niños. Los procesos clave que más relevancia tienen dentro de la microempresa son: la fabricación de las prendas, la gestión de inventarios y el proceso de logística. Los métodos de levantamiento de la información implementados fueron: la entrevista y la observación directa, para así visualizar cómo se desarrollaban cada uno los procesos, estas actividades se realizaron con ayuda de la propietaria de la microempresa.</a:t>
             </a:r>
-            <a:endParaRPr/>
+            <a:endParaRPr dirty="0"/>
           </a:p>
           <a:p>
             <a:pPr marL="0" marR="0" lvl="0" indent="0" algn="just" rtl="0">
@@ -11788,7 +11788,7 @@
               <a:buNone/>
             </a:pPr>
             <a:r>
-              <a:rPr lang="es-ES" sz="1600">
+              <a:rPr lang="es-ES" sz="1600" dirty="0">
                 <a:solidFill>
                   <a:srgbClr val="3F3F3F"/>
                 </a:solidFill>
@@ -11797,9 +11797,9 @@
                 <a:cs typeface="Calibri"/>
                 <a:sym typeface="Calibri"/>
               </a:rPr>
-              <a:t>Una vez realizada la recolección de la información se evidencia que falta organización en el proceso de gestión de inventario, este proceso se hace muchas veces manualmente y esto conlleva a la pérdida de esta información en algunos casos.</a:t>
+              <a:t>Una vez realizada la recolección de la información se evidenció que hace falta organización en el proceso de gestión de inventario, este proceso se hace en ocasiones manualmente o haciendo uso de Excel lo que conlleva a la pérdida de información en algunas ocasiones.</a:t>
             </a:r>
-            <a:endParaRPr sz="1600">
+            <a:endParaRPr sz="1600" dirty="0">
               <a:solidFill>
                 <a:srgbClr val="3F3F3F"/>
               </a:solidFill>
@@ -12268,7 +12268,7 @@
               <a:buNone/>
             </a:pPr>
             <a:r>
-              <a:rPr lang="es-ES" sz="1600" b="1">
+              <a:rPr lang="es-ES" sz="1600" b="1" dirty="0">
                 <a:solidFill>
                   <a:srgbClr val="3F3F3F"/>
                 </a:solidFill>
@@ -12279,7 +12279,7 @@
               </a:rPr>
               <a:t>OBJETIVO GENERAL</a:t>
             </a:r>
-            <a:endParaRPr/>
+            <a:endParaRPr dirty="0"/>
           </a:p>
           <a:p>
             <a:pPr marL="457200" marR="0" lvl="1" indent="0" algn="l" rtl="0">
@@ -12291,7 +12291,7 @@
               </a:spcAft>
               <a:buNone/>
             </a:pPr>
-            <a:endParaRPr sz="1600" b="0" i="0" u="none" strike="noStrike" cap="none">
+            <a:endParaRPr sz="1600" b="0" i="0" u="none" strike="noStrike" cap="none" dirty="0">
               <a:solidFill>
                 <a:srgbClr val="3F3F3F"/>
               </a:solidFill>
@@ -12312,7 +12312,7 @@
               <a:buNone/>
             </a:pPr>
             <a:r>
-              <a:rPr lang="es-ES" sz="1600" b="0" i="0" u="none" strike="noStrike" cap="none">
+              <a:rPr lang="es-ES" sz="1600" b="0" i="0" u="none" strike="noStrike" cap="none" dirty="0">
                 <a:solidFill>
                   <a:srgbClr val="3F3F3F"/>
                 </a:solidFill>
@@ -12324,7 +12324,7 @@
               <a:t>Desarrollar un sistema de Información W</a:t>
             </a:r>
             <a:r>
-              <a:rPr lang="es-ES" sz="1600">
+              <a:rPr lang="es-ES" sz="1600" dirty="0">
                 <a:solidFill>
                   <a:srgbClr val="3F3F3F"/>
                 </a:solidFill>
@@ -12336,7 +12336,7 @@
               <a:t>eb </a:t>
             </a:r>
             <a:r>
-              <a:rPr lang="es-ES" sz="1600" b="0" i="0" u="none" strike="noStrike" cap="none">
+              <a:rPr lang="es-ES" sz="1600" b="0" i="0" u="none" strike="noStrike" cap="none" dirty="0">
                 <a:solidFill>
                   <a:srgbClr val="3F3F3F"/>
                 </a:solidFill>
@@ -12347,7 +12347,7 @@
               </a:rPr>
               <a:t>que sirva como apoyo al proceso de la gestión de inventarios en la empresa Vitugoz.</a:t>
             </a:r>
-            <a:endParaRPr sz="1600" b="0" i="0" u="none" strike="noStrike" cap="none">
+            <a:endParaRPr sz="1600" b="0" i="0" u="none" strike="noStrike" cap="none" dirty="0">
               <a:solidFill>
                 <a:srgbClr val="3F3F3F"/>
               </a:solidFill>
@@ -12367,7 +12367,7 @@
               </a:spcAft>
               <a:buNone/>
             </a:pPr>
-            <a:endParaRPr sz="1600" b="0" i="0" u="none" strike="noStrike" cap="none">
+            <a:endParaRPr sz="1600" b="0" i="0" u="none" strike="noStrike" cap="none" dirty="0">
               <a:solidFill>
                 <a:srgbClr val="3F3F3F"/>
               </a:solidFill>
@@ -12414,7 +12414,7 @@
               <a:buNone/>
             </a:pPr>
             <a:r>
-              <a:rPr lang="es-ES" sz="1600" b="1">
+              <a:rPr lang="es-ES" sz="1600" b="1" dirty="0">
                 <a:solidFill>
                   <a:srgbClr val="3F3F3F"/>
                 </a:solidFill>
@@ -12425,7 +12425,7 @@
               </a:rPr>
               <a:t>OBJETIVOS ESPECÍFICOS</a:t>
             </a:r>
-            <a:endParaRPr/>
+            <a:endParaRPr dirty="0"/>
           </a:p>
           <a:p>
             <a:pPr marL="342900" marR="0" lvl="0" indent="-241300" algn="l" rtl="0">
@@ -12442,7 +12442,7 @@
               <a:buFont typeface="Calibri"/>
               <a:buNone/>
             </a:pPr>
-            <a:endParaRPr sz="1600">
+            <a:endParaRPr sz="1600" dirty="0">
               <a:solidFill>
                 <a:srgbClr val="3F3F3F"/>
               </a:solidFill>
@@ -12468,48 +12468,7 @@
               <a:buChar char="•"/>
             </a:pPr>
             <a:r>
-              <a:rPr lang="es-ES" sz="1600">
-                <a:solidFill>
-                  <a:srgbClr val="3F3F3F"/>
-                </a:solidFill>
-                <a:latin typeface="Calibri"/>
-                <a:ea typeface="Calibri"/>
-                <a:cs typeface="Calibri"/>
-                <a:sym typeface="Calibri"/>
-              </a:rPr>
-              <a:t>Gestionar </a:t>
-            </a:r>
-            <a:r>
-              <a:rPr lang="es-ES" sz="1600" b="0" i="0" u="none" strike="noStrike" cap="none">
-                <a:solidFill>
-                  <a:srgbClr val="3F3F3F"/>
-                </a:solidFill>
-                <a:latin typeface="Calibri"/>
-                <a:ea typeface="Calibri"/>
-                <a:cs typeface="Calibri"/>
-                <a:sym typeface="Calibri"/>
-              </a:rPr>
-              <a:t>el proceso de gestión de inventarios.</a:t>
-            </a:r>
-            <a:endParaRPr/>
-          </a:p>
-          <a:p>
-            <a:pPr marL="800100" marR="0" lvl="1" indent="-342900" algn="just" rtl="0">
-              <a:spcBef>
-                <a:spcPts val="0"/>
-              </a:spcBef>
-              <a:spcAft>
-                <a:spcPts val="0"/>
-              </a:spcAft>
-              <a:buClr>
-                <a:srgbClr val="3F3F3F"/>
-              </a:buClr>
-              <a:buSzPts val="1600"/>
-              <a:buFont typeface="Arial"/>
-              <a:buChar char="•"/>
-            </a:pPr>
-            <a:r>
-              <a:rPr lang="es-ES" sz="1600" b="0" i="0" u="none" strike="noStrike" cap="none">
+              <a:rPr lang="es-ES" sz="1600" b="0" i="0" u="none" strike="noStrike" cap="none" dirty="0">
                 <a:solidFill>
                   <a:srgbClr val="3F3F3F"/>
                 </a:solidFill>
@@ -12521,7 +12480,7 @@
               <a:t>Gestionar los </a:t>
             </a:r>
             <a:r>
-              <a:rPr lang="es-ES" sz="1600">
+              <a:rPr lang="es-ES" sz="1600" dirty="0">
                 <a:solidFill>
                   <a:srgbClr val="3F3F3F"/>
                 </a:solidFill>
@@ -12533,7 +12492,7 @@
               <a:t>u</a:t>
             </a:r>
             <a:r>
-              <a:rPr lang="es-ES" sz="1600" b="0" i="0" u="none" strike="noStrike" cap="none">
+              <a:rPr lang="es-ES" sz="1600" b="0" i="0" u="none" strike="noStrike" cap="none" dirty="0">
                 <a:solidFill>
                   <a:srgbClr val="3F3F3F"/>
                 </a:solidFill>
@@ -12544,7 +12503,7 @@
               </a:rPr>
               <a:t>suarios de la Empresa Vitugoz.</a:t>
             </a:r>
-            <a:endParaRPr/>
+            <a:endParaRPr dirty="0"/>
           </a:p>
           <a:p>
             <a:pPr marL="800100" marR="0" lvl="1" indent="-342900" algn="just" rtl="0">
@@ -12562,7 +12521,7 @@
               <a:buChar char="•"/>
             </a:pPr>
             <a:r>
-              <a:rPr lang="es-ES" sz="1600">
+              <a:rPr lang="es-ES" sz="1600" dirty="0">
                 <a:solidFill>
                   <a:srgbClr val="3F3F3F"/>
                 </a:solidFill>
@@ -12574,7 +12533,7 @@
               <a:t>Gestionar el</a:t>
             </a:r>
             <a:r>
-              <a:rPr lang="es-ES" sz="1600" b="0" i="0" u="none" strike="noStrike" cap="none">
+              <a:rPr lang="es-ES" sz="1600" b="0" i="0" u="none" strike="noStrike" cap="none" dirty="0">
                 <a:solidFill>
                   <a:srgbClr val="3F3F3F"/>
                 </a:solidFill>
@@ -12585,7 +12544,7 @@
               </a:rPr>
               <a:t> stock en tiempo real para tener un control claro sobre el mismo.</a:t>
             </a:r>
-            <a:endParaRPr sz="1600" b="0" i="0" u="none" strike="noStrike" cap="none">
+            <a:endParaRPr sz="1600" b="0" i="0" u="none" strike="noStrike" cap="none" dirty="0">
               <a:solidFill>
                 <a:srgbClr val="3F3F3F"/>
               </a:solidFill>
@@ -12611,7 +12570,7 @@
               <a:buChar char="•"/>
             </a:pPr>
             <a:r>
-              <a:rPr lang="es-ES" sz="1600">
+              <a:rPr lang="es-ES" sz="1600" dirty="0">
                 <a:solidFill>
                   <a:srgbClr val="3F3F3F"/>
                 </a:solidFill>
@@ -12622,7 +12581,7 @@
               </a:rPr>
               <a:t>Gestionar los datos de las compras de insumos y/o productos.</a:t>
             </a:r>
-            <a:endParaRPr sz="1600">
+            <a:endParaRPr sz="1600" dirty="0">
               <a:solidFill>
                 <a:srgbClr val="3F3F3F"/>
               </a:solidFill>
@@ -12648,7 +12607,7 @@
               <a:buChar char="•"/>
             </a:pPr>
             <a:r>
-              <a:rPr lang="es-ES" sz="1600">
+              <a:rPr lang="es-ES" sz="1600" dirty="0">
                 <a:solidFill>
                   <a:srgbClr val="3F3F3F"/>
                 </a:solidFill>
@@ -12660,7 +12619,7 @@
               <a:t>Gestionar</a:t>
             </a:r>
             <a:r>
-              <a:rPr lang="es-ES" sz="1600" b="0" i="0" u="none" strike="noStrike" cap="none">
+              <a:rPr lang="es-ES" sz="1600" b="0" i="0" u="none" strike="noStrike" cap="none" dirty="0">
                 <a:solidFill>
                   <a:srgbClr val="3F3F3F"/>
                 </a:solidFill>
@@ -12671,7 +12630,7 @@
               </a:rPr>
               <a:t> un módulo administrativo para tener control sobre todo el sistema.</a:t>
             </a:r>
-            <a:endParaRPr/>
+            <a:endParaRPr dirty="0"/>
           </a:p>
           <a:p>
             <a:pPr marL="800100" marR="0" lvl="1" indent="-342900" algn="just" rtl="0">
@@ -12689,7 +12648,7 @@
               <a:buChar char="•"/>
             </a:pPr>
             <a:r>
-              <a:rPr lang="es-ES" sz="1600" b="0" i="0" u="none" strike="noStrike" cap="none">
+              <a:rPr lang="es-ES" sz="1600" b="0" i="0" u="none" strike="noStrike" cap="none" dirty="0">
                 <a:solidFill>
                   <a:srgbClr val="3F3F3F"/>
                 </a:solidFill>
@@ -12700,7 +12659,7 @@
               </a:rPr>
               <a:t>Gestionar los proveedores de la empresa para facilitar el contacto con los mismos.</a:t>
             </a:r>
-            <a:endParaRPr/>
+            <a:endParaRPr dirty="0"/>
           </a:p>
           <a:p>
             <a:pPr marL="800100" marR="0" lvl="1" indent="-342900" algn="just" rtl="0">
@@ -12718,7 +12677,7 @@
               <a:buChar char="•"/>
             </a:pPr>
             <a:r>
-              <a:rPr lang="es-ES" sz="1600" b="0" i="0" u="none" strike="noStrike" cap="none">
+              <a:rPr lang="es-ES" sz="1600" b="0" i="0" u="none" strike="noStrike" cap="none" dirty="0">
                 <a:solidFill>
                   <a:srgbClr val="3F3F3F"/>
                 </a:solidFill>
@@ -12729,7 +12688,7 @@
               </a:rPr>
               <a:t>Gestionar los reportes gráficos e impresos de la Empresa Vitugoz.</a:t>
             </a:r>
-            <a:endParaRPr sz="1600" b="0" i="0" u="none" strike="noStrike" cap="none">
+            <a:endParaRPr sz="1600" b="0" i="0" u="none" strike="noStrike" cap="none" dirty="0">
               <a:solidFill>
                 <a:srgbClr val="3F3F3F"/>
               </a:solidFill>
@@ -12754,7 +12713,7 @@
               <a:buFont typeface="Calibri"/>
               <a:buNone/>
             </a:pPr>
-            <a:endParaRPr sz="1600" b="0" i="0" u="none" strike="noStrike" cap="none">
+            <a:endParaRPr sz="1600" b="0" i="0" u="none" strike="noStrike" cap="none" dirty="0">
               <a:solidFill>
                 <a:srgbClr val="3F3F3F"/>
               </a:solidFill>
@@ -13283,7 +13242,7 @@
               <a:buNone/>
             </a:pPr>
             <a:r>
-              <a:rPr lang="es-ES" sz="1600">
+              <a:rPr lang="es-ES" sz="1600" dirty="0">
                 <a:solidFill>
                   <a:srgbClr val="3F3F3F"/>
                 </a:solidFill>
@@ -13292,9 +13251,33 @@
                 <a:cs typeface="Calibri"/>
                 <a:sym typeface="Calibri"/>
               </a:rPr>
-              <a:t>El deseo de apoyar a una microempresa para que se beneficien de los sistemas de información nos llevó a elegir la empresa Vitugoz, ya que, pese a que cuentan con un sistema Web para realizar ventas Online se identificó que tienen algunas falencias en el proceso para la gestión de inventarios. Se propone el desarrollo de un Sistema de Información Web denominado JNC Developer, que sirva como herramienta software de apoyo al seguimiento del proceso de gestión de inventarios, gestión de usuarios y la gestión de reportes gráficos de la empresa Vitugoz. En la gestión de usuarios el/los Administrador/es podrán dar acceso a los Usuarios encargados de hacer el manejo del inventario, así mismo, tendrán el control total para gestionar los perfiles y roles. En el apartado de gestión de inventarios los usuarios (operarios) y administrador/es podrán visualizar en tiempo real el stock disponible para estar al tanto de lo que ocurre con esto; así mismo gestionar los proveedores que interactúan directamente con la compañía. Finalmente, facilitará la gestión de reportes gráficos e impresos, necesarios para la toma de decisiones del personal administrativo de la Empresa Vigutoz. </a:t>
+              <a:t>El deseo de apoyar a una microempresa para que se beneficien de los sistemas de información nos llevó a elegir la empresa Vitugoz, ya que, pese a que cuentan con un sistema Web para realizar ventas Online se identificó que tienen algunas falencias en el proceso para la gestión de inventarios. Se propone el desarrollo de un Sistema de Información Web denominado ‘JNC </a:t>
             </a:r>
-            <a:endParaRPr sz="1600">
+            <a:r>
+              <a:rPr lang="es-ES" sz="1600" dirty="0" err="1">
+                <a:solidFill>
+                  <a:srgbClr val="3F3F3F"/>
+                </a:solidFill>
+                <a:latin typeface="Calibri"/>
+                <a:ea typeface="Calibri"/>
+                <a:cs typeface="Calibri"/>
+                <a:sym typeface="Calibri"/>
+              </a:rPr>
+              <a:t>Developer</a:t>
+            </a:r>
+            <a:r>
+              <a:rPr lang="es-ES" sz="1600" dirty="0">
+                <a:solidFill>
+                  <a:srgbClr val="3F3F3F"/>
+                </a:solidFill>
+                <a:latin typeface="Calibri"/>
+                <a:ea typeface="Calibri"/>
+                <a:cs typeface="Calibri"/>
+                <a:sym typeface="Calibri"/>
+              </a:rPr>
+              <a:t>’, que sirva como herramienta software de apoyo al seguimiento del proceso de gestión de inventarios, usuarios, proveedores y reportes gráficos de la empresa Vitugoz. En la gestión de usuarios el/los Administrador/es podrán dar acceso a los Usuarios encargados de hacer el manejo del inventario, así mismo, tendrán el control total para gestionar los perfiles y roles. En el apartado de gestión de inventarios los usuarios (operarios) y administrador/es podrán visualizar en tiempo real el stock disponible para estar al tanto de lo que ocurre con este; así mismo gestionar los proveedores que interactúan directamente con la compañía. Finalmente, facilitará la gestión de reportes gráficos e impresos, necesarios para la toma de decisiones del personal administrativo de la Empresa Vigutoz. </a:t>
+            </a:r>
+            <a:endParaRPr sz="1600" dirty="0">
               <a:solidFill>
                 <a:srgbClr val="3F3F3F"/>
               </a:solidFill>

</xml_diff>

<commit_message>
Se cargan los archivos del 3 trimestre y se ordenan los entregables
</commit_message>
<xml_diff>
--- a/proy_formativo/documentacion/1er_Trim/1 - Plantilla de Presentación de la Sustentacion.pptx
+++ b/proy_formativo/documentacion/1er_Trim/1 - Plantilla de Presentación de la Sustentacion.pptx
@@ -785,8 +785,8 @@
         </p:nvSpPr>
         <p:spPr>
           <a:xfrm>
-            <a:off x="1143225" y="685800"/>
-            <a:ext cx="4572225" cy="3429000"/>
+            <a:off x="381000" y="685800"/>
+            <a:ext cx="6096000" cy="3429000"/>
           </a:xfrm>
           <a:custGeom>
             <a:avLst/>
@@ -1726,8 +1726,8 @@
         </p:nvSpPr>
         <p:spPr>
           <a:xfrm>
-            <a:off x="1143225" y="685800"/>
-            <a:ext cx="4572225" cy="3429000"/>
+            <a:off x="381000" y="685800"/>
+            <a:ext cx="6096000" cy="3429000"/>
           </a:xfrm>
           <a:custGeom>
             <a:avLst/>
@@ -7575,8 +7575,8 @@
         </p:nvSpPr>
         <p:spPr>
           <a:xfrm>
-            <a:off x="3193497" y="525024"/>
-            <a:ext cx="2757000" cy="958200"/>
+            <a:off x="3193499" y="711819"/>
+            <a:ext cx="2757000" cy="523180"/>
           </a:xfrm>
           <a:prstGeom prst="rect">
             <a:avLst/>
@@ -7602,7 +7602,7 @@
               <a:buNone/>
             </a:pPr>
             <a:r>
-              <a:rPr lang="es-ES" sz="2800" b="1" i="0" u="none" strike="noStrike" cap="none">
+              <a:rPr lang="es-ES" sz="2800" b="1" i="0" u="none" strike="noStrike" cap="none" dirty="0">
                 <a:solidFill>
                   <a:srgbClr val="3F3F3F"/>
                 </a:solidFill>
@@ -7611,9 +7611,9 @@
                 <a:cs typeface="Calibri"/>
                 <a:sym typeface="Calibri"/>
               </a:rPr>
-              <a:t>JNC Development</a:t>
+              <a:t>Gestor-E</a:t>
             </a:r>
-            <a:endParaRPr sz="2800" b="1" i="0" u="none" strike="noStrike" cap="none">
+            <a:endParaRPr sz="2800" b="1" i="0" u="none" strike="noStrike" cap="none" dirty="0">
               <a:solidFill>
                 <a:srgbClr val="3F3F3F"/>
               </a:solidFill>
@@ -7660,7 +7660,7 @@
               <a:buNone/>
             </a:pPr>
             <a:r>
-              <a:rPr lang="es-ES" sz="1200" b="1" i="0" u="none" strike="noStrike" cap="none">
+              <a:rPr lang="es-ES" sz="1200" b="1" i="0" u="none" strike="noStrike" cap="none" dirty="0">
                 <a:solidFill>
                   <a:srgbClr val="3F3F3F"/>
                 </a:solidFill>
@@ -7671,7 +7671,7 @@
               </a:rPr>
               <a:t>Servicio Nacional de Aprendizaje – SENA, Centro de Electricidad Electrónica y Telecomunicaciones</a:t>
             </a:r>
-            <a:endParaRPr/>
+            <a:endParaRPr dirty="0"/>
           </a:p>
           <a:p>
             <a:pPr marL="0" marR="0" lvl="0" indent="0" algn="ctr" rtl="0">
@@ -7683,6 +7683,18 @@
               </a:spcAft>
               <a:buNone/>
             </a:pPr>
+            <a:r>
+              <a:rPr lang="es-ES" sz="1200" b="1" i="0" u="none" strike="noStrike" cap="none" dirty="0">
+                <a:solidFill>
+                  <a:srgbClr val="3F3F3F"/>
+                </a:solidFill>
+                <a:latin typeface="Calibri"/>
+                <a:ea typeface="Calibri"/>
+                <a:cs typeface="Calibri"/>
+                <a:sym typeface="Calibri"/>
+              </a:rPr>
+              <a:t>Análisis y Desarrollo de Sistemas de Información</a:t>
+            </a:r>
             <a:r>
               <a:rPr lang="es-ES" sz="1200" b="1" i="0" u="none" strike="noStrike" cap="none">
                 <a:solidFill>
@@ -7693,9 +7705,21 @@
                 <a:cs typeface="Calibri"/>
                 <a:sym typeface="Calibri"/>
               </a:rPr>
-              <a:t>Análisis y Desarrollo de Sistemas de Información, Segundo Trimestre</a:t>
+              <a:t>, Tercer </a:t>
             </a:r>
-            <a:endParaRPr/>
+            <a:r>
+              <a:rPr lang="es-ES" sz="1200" b="1" i="0" u="none" strike="noStrike" cap="none" dirty="0">
+                <a:solidFill>
+                  <a:srgbClr val="3F3F3F"/>
+                </a:solidFill>
+                <a:latin typeface="Calibri"/>
+                <a:ea typeface="Calibri"/>
+                <a:cs typeface="Calibri"/>
+                <a:sym typeface="Calibri"/>
+              </a:rPr>
+              <a:t>Trimestre</a:t>
+            </a:r>
+            <a:endParaRPr dirty="0"/>
           </a:p>
           <a:p>
             <a:pPr marL="0" marR="0" lvl="0" indent="0" algn="ctr" rtl="0">
@@ -7708,7 +7732,7 @@
               <a:buNone/>
             </a:pPr>
             <a:r>
-              <a:rPr lang="es-ES" sz="1200" b="1" i="0" u="none" strike="noStrike" cap="none">
+              <a:rPr lang="es-ES" sz="1200" b="1" i="0" u="none" strike="noStrike" cap="none" dirty="0">
                 <a:solidFill>
                   <a:srgbClr val="3F3F3F"/>
                 </a:solidFill>
@@ -7719,7 +7743,7 @@
               </a:rPr>
               <a:t>Instructor Albeiro Ramos </a:t>
             </a:r>
-            <a:endParaRPr/>
+            <a:endParaRPr dirty="0"/>
           </a:p>
           <a:p>
             <a:pPr marL="0" marR="0" lvl="0" indent="0" algn="ctr" rtl="0">
@@ -7732,7 +7756,7 @@
               <a:buNone/>
             </a:pPr>
             <a:r>
-              <a:rPr lang="es-ES" sz="1200" b="1" i="0" u="none" strike="noStrike" cap="none">
+              <a:rPr lang="es-ES" sz="1200" b="1" i="0" u="none" strike="noStrike" cap="none" dirty="0">
                 <a:solidFill>
                   <a:srgbClr val="3F3F3F"/>
                 </a:solidFill>
@@ -7743,7 +7767,7 @@
               </a:rPr>
               <a:t>Bogotá, 18 de marzo de 2021</a:t>
             </a:r>
-            <a:endParaRPr/>
+            <a:endParaRPr dirty="0"/>
           </a:p>
         </p:txBody>
       </p:sp>
@@ -7755,8 +7779,8 @@
         </p:nvSpPr>
         <p:spPr>
           <a:xfrm>
-            <a:off x="896111" y="2529766"/>
-            <a:ext cx="7324717" cy="646331"/>
+            <a:off x="896111" y="2714452"/>
+            <a:ext cx="7324717" cy="276959"/>
           </a:xfrm>
           <a:prstGeom prst="rect">
             <a:avLst/>
@@ -7782,55 +7806,7 @@
               <a:buNone/>
             </a:pPr>
             <a:r>
-              <a:rPr lang="es-ES" sz="1200" b="1" i="0" u="none" strike="noStrike" cap="none">
-                <a:solidFill>
-                  <a:srgbClr val="3F3F3F"/>
-                </a:solidFill>
-                <a:latin typeface="Calibri"/>
-                <a:ea typeface="Calibri"/>
-                <a:cs typeface="Calibri"/>
-                <a:sym typeface="Calibri"/>
-              </a:rPr>
-              <a:t>Johan Camilo Hueso Florido</a:t>
-            </a:r>
-            <a:endParaRPr/>
-          </a:p>
-          <a:p>
-            <a:pPr marL="0" marR="0" lvl="0" indent="0" algn="ctr" rtl="0">
-              <a:spcBef>
-                <a:spcPts val="0"/>
-              </a:spcBef>
-              <a:spcAft>
-                <a:spcPts val="0"/>
-              </a:spcAft>
-              <a:buNone/>
-            </a:pPr>
-            <a:r>
-              <a:rPr lang="es-ES" sz="1200" b="1" i="0" u="none" strike="noStrike" cap="none">
-                <a:solidFill>
-                  <a:srgbClr val="3F3F3F"/>
-                </a:solidFill>
-                <a:latin typeface="Calibri"/>
-                <a:ea typeface="Calibri"/>
-                <a:cs typeface="Calibri"/>
-                <a:sym typeface="Calibri"/>
-              </a:rPr>
-              <a:t>Carlos Alfredo Castillo Quitan</a:t>
-            </a:r>
-            <a:endParaRPr/>
-          </a:p>
-          <a:p>
-            <a:pPr marL="0" marR="0" lvl="0" indent="0" algn="ctr" rtl="0">
-              <a:spcBef>
-                <a:spcPts val="0"/>
-              </a:spcBef>
-              <a:spcAft>
-                <a:spcPts val="0"/>
-              </a:spcAft>
-              <a:buNone/>
-            </a:pPr>
-            <a:r>
-              <a:rPr lang="es-ES" sz="1200" b="1" i="0" u="none" strike="noStrike" cap="none">
+              <a:rPr lang="es-ES" sz="1200" b="1" i="0" u="none" strike="noStrike" cap="none" dirty="0">
                 <a:solidFill>
                   <a:srgbClr val="3F3F3F"/>
                 </a:solidFill>
@@ -7841,38 +7817,10 @@
               </a:rPr>
               <a:t>Jeisson Nicolas Reatiga Otalora</a:t>
             </a:r>
-            <a:endParaRPr/>
+            <a:endParaRPr dirty="0"/>
           </a:p>
         </p:txBody>
       </p:sp>
-      <p:pic>
-        <p:nvPicPr>
-          <p:cNvPr id="58" name="Google Shape;58;p1"/>
-          <p:cNvPicPr preferRelativeResize="0"/>
-          <p:nvPr/>
-        </p:nvPicPr>
-        <p:blipFill>
-          <a:blip r:embed="rId3">
-            <a:alphaModFix/>
-          </a:blip>
-          <a:stretch>
-            <a:fillRect/>
-          </a:stretch>
-        </p:blipFill>
-        <p:spPr>
-          <a:xfrm>
-            <a:off x="4027737" y="1483220"/>
-            <a:ext cx="1088525" cy="1088525"/>
-          </a:xfrm>
-          <a:prstGeom prst="rect">
-            <a:avLst/>
-          </a:prstGeom>
-          <a:noFill/>
-          <a:ln>
-            <a:noFill/>
-          </a:ln>
-        </p:spPr>
-      </p:pic>
     </p:spTree>
   </p:cSld>
   <p:clrMapOvr>
@@ -8369,7 +8317,7 @@
                 <a:cs typeface="Calibri"/>
                 <a:sym typeface="Calibri"/>
               </a:rPr>
-              <a:t>El administrador o persona que cumpla con el rol requerido, es la única que hará la creación de usuarios y asignación de roles, también tendrá el control para gestionar los productos en stock y la información de proveedores. El usuario (operario) podrá hacer la creación y actualización de cada uno de los procesos, y esto estará en la trazabilidad para tener una buena gestión de la información.</a:t>
+              <a:t>El administrador o persona que cumpla con el rol requerido es la única que hará la creación de usuarios y asignación de roles, también tendrá el control para gestionar los productos en stock y la información de proveedores. El usuario (operario) podrá hacer la creación y actualización de cada uno de los procesos, y esto estará en la trazabilidad para tener una buena gestión de la información.</a:t>
             </a:r>
             <a:endParaRPr dirty="0"/>
           </a:p>
@@ -11626,34 +11574,6 @@
           </a:p>
         </p:txBody>
       </p:sp>
-      <p:pic>
-        <p:nvPicPr>
-          <p:cNvPr id="87" name="Google Shape;87;p4"/>
-          <p:cNvPicPr preferRelativeResize="0"/>
-          <p:nvPr/>
-        </p:nvPicPr>
-        <p:blipFill>
-          <a:blip r:embed="rId4">
-            <a:alphaModFix/>
-          </a:blip>
-          <a:stretch>
-            <a:fillRect/>
-          </a:stretch>
-        </p:blipFill>
-        <p:spPr>
-          <a:xfrm>
-            <a:off x="7722725" y="3722225"/>
-            <a:ext cx="1421275" cy="1421275"/>
-          </a:xfrm>
-          <a:prstGeom prst="rect">
-            <a:avLst/>
-          </a:prstGeom>
-          <a:noFill/>
-          <a:ln>
-            <a:noFill/>
-          </a:ln>
-        </p:spPr>
-      </p:pic>
     </p:spTree>
   </p:cSld>
   <p:clrMapOvr>
@@ -13251,31 +13171,7 @@
                 <a:cs typeface="Calibri"/>
                 <a:sym typeface="Calibri"/>
               </a:rPr>
-              <a:t>El deseo de apoyar a una microempresa para que se beneficien de los sistemas de información nos llevó a elegir la empresa Vitugoz, ya que, pese a que cuentan con un sistema Web para realizar ventas Online se identificó que tienen algunas falencias en el proceso para la gestión de inventarios. Se propone el desarrollo de un Sistema de Información Web denominado ‘JNC </a:t>
-            </a:r>
-            <a:r>
-              <a:rPr lang="es-ES" sz="1600" dirty="0" err="1">
-                <a:solidFill>
-                  <a:srgbClr val="3F3F3F"/>
-                </a:solidFill>
-                <a:latin typeface="Calibri"/>
-                <a:ea typeface="Calibri"/>
-                <a:cs typeface="Calibri"/>
-                <a:sym typeface="Calibri"/>
-              </a:rPr>
-              <a:t>Developer</a:t>
-            </a:r>
-            <a:r>
-              <a:rPr lang="es-ES" sz="1600" dirty="0">
-                <a:solidFill>
-                  <a:srgbClr val="3F3F3F"/>
-                </a:solidFill>
-                <a:latin typeface="Calibri"/>
-                <a:ea typeface="Calibri"/>
-                <a:cs typeface="Calibri"/>
-                <a:sym typeface="Calibri"/>
-              </a:rPr>
-              <a:t>’, que sirva como herramienta software de apoyo al seguimiento del proceso de gestión de inventarios, usuarios, proveedores y reportes gráficos de la empresa Vitugoz. En la gestión de usuarios el/los Administrador/es podrán dar acceso a los Usuarios encargados de hacer el manejo del inventario, así mismo, tendrán el control total para gestionar los perfiles y roles. En el apartado de gestión de inventarios los usuarios (operarios) y administrador/es podrán visualizar en tiempo real el stock disponible para estar al tanto de lo que ocurre con este; así mismo gestionar los proveedores que interactúan directamente con la compañía. Finalmente, facilitará la gestión de reportes gráficos e impresos, necesarios para la toma de decisiones del personal administrativo de la Empresa Vigutoz. </a:t>
+              <a:t>El deseo de apoyar a una microempresa para que se beneficien de los sistemas de información nos llevó a elegir la empresa Vitugoz, ya que, pese a que cuentan con un sistema Web para realizar ventas Online se identificó que tienen algunas falencias en el proceso para la gestión de inventarios. Se propone el desarrollo de un Sistema de Información Web denominado ‘Gestor-E’, que sirva como herramienta software de apoyo al seguimiento del proceso de gestión de inventarios, usuarios, proveedores y reportes gráficos de la empresa Vitugoz. En la gestión de usuarios el/los Administrador/es podrán dar acceso a los Usuarios encargados de hacer el manejo del inventario, así mismo, tendrán el control total para gestionar los perfiles y roles. En el apartado de gestión de inventarios los usuarios (operarios) y administrador/es podrán visualizar en tiempo real el stock disponible para estar al tanto de lo que ocurre con este; así mismo gestionar los proveedores que interactúan directamente con la compañía. Finalmente, facilitará la gestión de reportes gráficos e impresos, necesarios para la toma de decisiones del personal administrativo de la Empresa Vigutoz. </a:t>
             </a:r>
             <a:endParaRPr sz="1600" dirty="0">
               <a:solidFill>

</xml_diff>